<commit_message>
fixed wrong url for jdk
</commit_message>
<xml_diff>
--- a/doc/Resilient Microservices.pptx
+++ b/doc/Resilient Microservices.pptx
@@ -3151,12 +3151,9 @@
               <a:rPr lang="en-US" dirty="0"/>
             </a:br>
             <a:r>
-              <a:rPr lang="en-US" dirty="0">
-                <a:hlinkClick r:id="rId2"/>
-              </a:rPr>
-              <a:t>https://java.com/de/download/</a:t>
-            </a:r>
-            <a:endParaRPr lang="en-US" dirty="0"/>
+              <a:rPr lang="en-US" dirty="0"/>
+              <a:t>https://www.oracle.com/java/technologies/javase/javase-jdk8-downloads.html</a:t>
+            </a:r>
           </a:p>
           <a:p>
             <a:r>

</xml_diff>